<commit_message>
upravena prezentace - final version
</commit_message>
<xml_diff>
--- a/docs/sibenice.pptx
+++ b/docs/sibenice.pptx
@@ -237,7 +237,7 @@
             <a:pPr rtl="0"/>
             <a:fld id="{39C5546F-049B-4D3C-98F8-0A4D86323ED5}" type="datetime1">
               <a:rPr lang="cs-CZ" smtClean="0"/>
-              <a:t>05.05.2025</a:t>
+              <a:t>06.05.2025</a:t>
             </a:fld>
             <a:endParaRPr lang="cs-CZ"/>
           </a:p>
@@ -419,7 +419,7 @@
             <a:fld id="{DBB45D0C-8591-4C5B-8595-B105B06ACE71}" type="datetime1">
               <a:rPr lang="cs-CZ" smtClean="0"/>
               <a:pPr/>
-              <a:t>05.05.2025</a:t>
+              <a:t>06.05.2025</a:t>
             </a:fld>
             <a:endParaRPr lang="cs-CZ" dirty="0"/>
           </a:p>
@@ -1852,6 +1852,18 @@
   <p:clrMapOvr>
     <a:masterClrMapping/>
   </p:clrMapOvr>
+  <mc:AlternateContent xmlns:mc="http://schemas.openxmlformats.org/markup-compatibility/2006">
+    <mc:Choice xmlns:p159="http://schemas.microsoft.com/office/powerpoint/2015/09/main" Requires="p159">
+      <p:transition xmlns:p14="http://schemas.microsoft.com/office/powerpoint/2010/main" spd="slow" p14:dur="2000">
+        <p159:morph option="byObject"/>
+      </p:transition>
+    </mc:Choice>
+    <mc:Fallback>
+      <p:transition spd="slow">
+        <p:fade/>
+      </p:transition>
+    </mc:Fallback>
+  </mc:AlternateContent>
 </p:sldLayout>
 </file>
 
@@ -2289,7 +2301,7 @@
             <a:fld id="{76770F20-000B-4288-A5BA-3EFEE1DDBD6B}" type="datetime1">
               <a:rPr lang="cs-CZ" smtClean="0"/>
               <a:pPr/>
-              <a:t>05.05.2025</a:t>
+              <a:t>06.05.2025</a:t>
             </a:fld>
             <a:endParaRPr lang="cs-CZ"/>
           </a:p>
@@ -2403,6 +2415,18 @@
   <p:clrMapOvr>
     <a:masterClrMapping/>
   </p:clrMapOvr>
+  <mc:AlternateContent xmlns:mc="http://schemas.openxmlformats.org/markup-compatibility/2006">
+    <mc:Choice xmlns:p159="http://schemas.microsoft.com/office/powerpoint/2015/09/main" Requires="p159">
+      <p:transition xmlns:p14="http://schemas.microsoft.com/office/powerpoint/2010/main" spd="slow" p14:dur="2000">
+        <p159:morph option="byObject"/>
+      </p:transition>
+    </mc:Choice>
+    <mc:Fallback>
+      <p:transition spd="slow">
+        <p:fade/>
+      </p:transition>
+    </mc:Fallback>
+  </mc:AlternateContent>
 </p:sldLayout>
 </file>
 
@@ -3193,7 +3217,7 @@
             <a:fld id="{C84EBBF3-9595-406B-934C-BC9FF604A3DD}" type="datetime1">
               <a:rPr lang="cs-CZ" smtClean="0"/>
               <a:pPr/>
-              <a:t>05.05.2025</a:t>
+              <a:t>06.05.2025</a:t>
             </a:fld>
             <a:endParaRPr lang="cs-CZ"/>
           </a:p>
@@ -3607,6 +3631,18 @@
   <p:clrMapOvr>
     <a:masterClrMapping/>
   </p:clrMapOvr>
+  <mc:AlternateContent xmlns:mc="http://schemas.openxmlformats.org/markup-compatibility/2006">
+    <mc:Choice xmlns:p159="http://schemas.microsoft.com/office/powerpoint/2015/09/main" Requires="p159">
+      <p:transition xmlns:p14="http://schemas.microsoft.com/office/powerpoint/2010/main" spd="slow" p14:dur="2000">
+        <p159:morph option="byObject"/>
+      </p:transition>
+    </mc:Choice>
+    <mc:Fallback>
+      <p:transition spd="slow">
+        <p:fade/>
+      </p:transition>
+    </mc:Fallback>
+  </mc:AlternateContent>
 </p:sldLayout>
 </file>
 
@@ -4397,7 +4433,7 @@
             <a:fld id="{2A5C3A1B-E134-46A7-88E4-FED6F62A37B1}" type="datetime1">
               <a:rPr lang="cs-CZ" smtClean="0"/>
               <a:pPr/>
-              <a:t>05.05.2025</a:t>
+              <a:t>06.05.2025</a:t>
             </a:fld>
             <a:endParaRPr lang="cs-CZ"/>
           </a:p>
@@ -5011,6 +5047,18 @@
   <p:clrMapOvr>
     <a:masterClrMapping/>
   </p:clrMapOvr>
+  <mc:AlternateContent xmlns:mc="http://schemas.openxmlformats.org/markup-compatibility/2006">
+    <mc:Choice xmlns:p159="http://schemas.microsoft.com/office/powerpoint/2015/09/main" Requires="p159">
+      <p:transition xmlns:p14="http://schemas.microsoft.com/office/powerpoint/2010/main" spd="slow" p14:dur="2000">
+        <p159:morph option="byObject"/>
+      </p:transition>
+    </mc:Choice>
+    <mc:Fallback>
+      <p:transition spd="slow">
+        <p:fade/>
+      </p:transition>
+    </mc:Fallback>
+  </mc:AlternateContent>
 </p:sldLayout>
 </file>
 
@@ -5741,6 +5789,18 @@
   <p:clrMapOvr>
     <a:masterClrMapping/>
   </p:clrMapOvr>
+  <mc:AlternateContent xmlns:mc="http://schemas.openxmlformats.org/markup-compatibility/2006">
+    <mc:Choice xmlns:p159="http://schemas.microsoft.com/office/powerpoint/2015/09/main" Requires="p159">
+      <p:transition xmlns:p14="http://schemas.microsoft.com/office/powerpoint/2010/main" spd="slow" p14:dur="2000">
+        <p159:morph option="byObject"/>
+      </p:transition>
+    </mc:Choice>
+    <mc:Fallback>
+      <p:transition spd="slow">
+        <p:fade/>
+      </p:transition>
+    </mc:Fallback>
+  </mc:AlternateContent>
 </p:sldLayout>
 </file>
 
@@ -6531,7 +6591,7 @@
             <a:fld id="{E3AF7E7E-4A61-492A-BE6B-77C44A93B010}" type="datetime1">
               <a:rPr lang="cs-CZ" smtClean="0"/>
               <a:pPr/>
-              <a:t>05.05.2025</a:t>
+              <a:t>06.05.2025</a:t>
             </a:fld>
             <a:endParaRPr lang="cs-CZ"/>
           </a:p>
@@ -6645,6 +6705,18 @@
   <p:clrMapOvr>
     <a:masterClrMapping/>
   </p:clrMapOvr>
+  <mc:AlternateContent xmlns:mc="http://schemas.openxmlformats.org/markup-compatibility/2006">
+    <mc:Choice xmlns:p159="http://schemas.microsoft.com/office/powerpoint/2015/09/main" Requires="p159">
+      <p:transition xmlns:p14="http://schemas.microsoft.com/office/powerpoint/2010/main" spd="slow" p14:dur="2000">
+        <p159:morph option="byObject"/>
+      </p:transition>
+    </mc:Choice>
+    <mc:Fallback>
+      <p:transition spd="slow">
+        <p:fade/>
+      </p:transition>
+    </mc:Fallback>
+  </mc:AlternateContent>
 </p:sldLayout>
 </file>
 
@@ -7266,7 +7338,7 @@
             <a:fld id="{6C993CF5-AEE5-4FAA-A93D-EC26B8A9CB32}" type="datetime1">
               <a:rPr lang="cs-CZ" smtClean="0"/>
               <a:pPr/>
-              <a:t>05.05.2025</a:t>
+              <a:t>06.05.2025</a:t>
             </a:fld>
             <a:endParaRPr lang="cs-CZ"/>
           </a:p>
@@ -7369,6 +7441,18 @@
   <p:clrMapOvr>
     <a:masterClrMapping/>
   </p:clrMapOvr>
+  <mc:AlternateContent xmlns:mc="http://schemas.openxmlformats.org/markup-compatibility/2006">
+    <mc:Choice xmlns:p159="http://schemas.microsoft.com/office/powerpoint/2015/09/main" Requires="p159">
+      <p:transition xmlns:p14="http://schemas.microsoft.com/office/powerpoint/2010/main" spd="slow" p14:dur="2000">
+        <p159:morph option="byObject"/>
+      </p:transition>
+    </mc:Choice>
+    <mc:Fallback>
+      <p:transition spd="slow">
+        <p:fade/>
+      </p:transition>
+    </mc:Fallback>
+  </mc:AlternateContent>
 </p:sldLayout>
 </file>
 
@@ -8114,6 +8198,18 @@
   <p:clrMapOvr>
     <a:masterClrMapping/>
   </p:clrMapOvr>
+  <mc:AlternateContent xmlns:mc="http://schemas.openxmlformats.org/markup-compatibility/2006">
+    <mc:Choice xmlns:p159="http://schemas.microsoft.com/office/powerpoint/2015/09/main" Requires="p159">
+      <p:transition xmlns:p14="http://schemas.microsoft.com/office/powerpoint/2010/main" spd="slow" p14:dur="2000">
+        <p159:morph option="byObject"/>
+      </p:transition>
+    </mc:Choice>
+    <mc:Fallback>
+      <p:transition spd="slow">
+        <p:fade/>
+      </p:transition>
+    </mc:Fallback>
+  </mc:AlternateContent>
 </p:sldLayout>
 </file>
 
@@ -8525,7 +8621,7 @@
             <a:fld id="{3282E48B-9B45-433E-A3C3-54BB3C375215}" type="datetime1">
               <a:rPr lang="cs-CZ" smtClean="0"/>
               <a:pPr/>
-              <a:t>05.05.2025</a:t>
+              <a:t>06.05.2025</a:t>
             </a:fld>
             <a:endParaRPr lang="cs-CZ"/>
           </a:p>
@@ -8639,6 +8735,18 @@
   <p:clrMapOvr>
     <a:masterClrMapping/>
   </p:clrMapOvr>
+  <mc:AlternateContent xmlns:mc="http://schemas.openxmlformats.org/markup-compatibility/2006">
+    <mc:Choice xmlns:p159="http://schemas.microsoft.com/office/powerpoint/2015/09/main" Requires="p159">
+      <p:transition xmlns:p14="http://schemas.microsoft.com/office/powerpoint/2010/main" spd="slow" p14:dur="2000">
+        <p159:morph option="byObject"/>
+      </p:transition>
+    </mc:Choice>
+    <mc:Fallback>
+      <p:transition spd="slow">
+        <p:fade/>
+      </p:transition>
+    </mc:Fallback>
+  </mc:AlternateContent>
 </p:sldLayout>
 </file>
 
@@ -9131,7 +9239,7 @@
             <a:fld id="{4B952A7E-4760-4DEA-A0B0-94EB7944EB67}" type="datetime1">
               <a:rPr lang="cs-CZ" smtClean="0"/>
               <a:pPr/>
-              <a:t>05.05.2025</a:t>
+              <a:t>06.05.2025</a:t>
             </a:fld>
             <a:endParaRPr lang="cs-CZ"/>
           </a:p>
@@ -9245,6 +9353,18 @@
   <p:clrMapOvr>
     <a:masterClrMapping/>
   </p:clrMapOvr>
+  <mc:AlternateContent xmlns:mc="http://schemas.openxmlformats.org/markup-compatibility/2006">
+    <mc:Choice xmlns:p159="http://schemas.microsoft.com/office/powerpoint/2015/09/main" Requires="p159">
+      <p:transition xmlns:p14="http://schemas.microsoft.com/office/powerpoint/2010/main" spd="slow" p14:dur="2000">
+        <p159:morph option="byObject"/>
+      </p:transition>
+    </mc:Choice>
+    <mc:Fallback>
+      <p:transition spd="slow">
+        <p:fade/>
+      </p:transition>
+    </mc:Fallback>
+  </mc:AlternateContent>
 </p:sldLayout>
 </file>
 
@@ -9611,7 +9731,7 @@
             <a:fld id="{771916F5-0F92-4FCA-A533-363ED95C6374}" type="datetime1">
               <a:rPr lang="cs-CZ" smtClean="0"/>
               <a:pPr/>
-              <a:t>05.05.2025</a:t>
+              <a:t>06.05.2025</a:t>
             </a:fld>
             <a:endParaRPr lang="cs-CZ"/>
           </a:p>
@@ -9709,6 +9829,18 @@
   <p:clrMapOvr>
     <a:masterClrMapping/>
   </p:clrMapOvr>
+  <mc:AlternateContent xmlns:mc="http://schemas.openxmlformats.org/markup-compatibility/2006">
+    <mc:Choice xmlns:p159="http://schemas.microsoft.com/office/powerpoint/2015/09/main" Requires="p159">
+      <p:transition xmlns:p14="http://schemas.microsoft.com/office/powerpoint/2010/main" spd="slow" p14:dur="2000">
+        <p159:morph option="byObject"/>
+      </p:transition>
+    </mc:Choice>
+    <mc:Fallback>
+      <p:transition spd="slow">
+        <p:fade/>
+      </p:transition>
+    </mc:Fallback>
+  </mc:AlternateContent>
 </p:sldLayout>
 </file>
 
@@ -10480,7 +10612,7 @@
             <a:fld id="{14D5C098-AD32-4D94-840F-EACF03E2A32D}" type="datetime1">
               <a:rPr lang="cs-CZ" smtClean="0"/>
               <a:pPr/>
-              <a:t>05.05.2025</a:t>
+              <a:t>06.05.2025</a:t>
             </a:fld>
             <a:endParaRPr lang="cs-CZ"/>
           </a:p>
@@ -11431,6 +11563,18 @@
   <p:clrMapOvr>
     <a:masterClrMapping/>
   </p:clrMapOvr>
+  <mc:AlternateContent xmlns:mc="http://schemas.openxmlformats.org/markup-compatibility/2006">
+    <mc:Choice xmlns:p159="http://schemas.microsoft.com/office/powerpoint/2015/09/main" Requires="p159">
+      <p:transition xmlns:p14="http://schemas.microsoft.com/office/powerpoint/2010/main" spd="slow" p14:dur="2000">
+        <p159:morph option="byObject"/>
+      </p:transition>
+    </mc:Choice>
+    <mc:Fallback>
+      <p:transition spd="slow">
+        <p:fade/>
+      </p:transition>
+    </mc:Fallback>
+  </mc:AlternateContent>
 </p:sldLayout>
 </file>
 
@@ -12762,7 +12906,7 @@
             <a:fld id="{15DC0C50-C6FA-4C5C-A377-0477BC3CB2AB}" type="datetime1">
               <a:rPr lang="cs-CZ" smtClean="0"/>
               <a:pPr/>
-              <a:t>05.05.2025</a:t>
+              <a:t>06.05.2025</a:t>
             </a:fld>
             <a:endParaRPr lang="cs-CZ"/>
           </a:p>
@@ -12860,6 +13004,18 @@
   <p:clrMapOvr>
     <a:masterClrMapping/>
   </p:clrMapOvr>
+  <mc:AlternateContent xmlns:mc="http://schemas.openxmlformats.org/markup-compatibility/2006">
+    <mc:Choice xmlns:p159="http://schemas.microsoft.com/office/powerpoint/2015/09/main" Requires="p159">
+      <p:transition xmlns:p14="http://schemas.microsoft.com/office/powerpoint/2010/main" spd="slow" p14:dur="2000">
+        <p159:morph option="byObject"/>
+      </p:transition>
+    </mc:Choice>
+    <mc:Fallback>
+      <p:transition spd="slow">
+        <p:fade/>
+      </p:transition>
+    </mc:Fallback>
+  </mc:AlternateContent>
 </p:sldLayout>
 </file>
 
@@ -13035,7 +13191,7 @@
             <a:fld id="{6FDD9593-20E8-4909-ACEE-3D6A2D2FB455}" type="datetime1">
               <a:rPr lang="cs-CZ" smtClean="0"/>
               <a:pPr/>
-              <a:t>05.05.2025</a:t>
+              <a:t>06.05.2025</a:t>
             </a:fld>
             <a:endParaRPr lang="cs-CZ"/>
           </a:p>
@@ -13162,6 +13318,18 @@
     <p:sldLayoutId id="2147483665" r:id="rId12"/>
     <p:sldLayoutId id="2147483666" r:id="rId13"/>
   </p:sldLayoutIdLst>
+  <mc:AlternateContent xmlns:mc="http://schemas.openxmlformats.org/markup-compatibility/2006">
+    <mc:Choice xmlns:p159="http://schemas.microsoft.com/office/powerpoint/2015/09/main" Requires="p159">
+      <p:transition xmlns:p14="http://schemas.microsoft.com/office/powerpoint/2010/main" spd="slow" p14:dur="2000">
+        <p159:morph option="byObject"/>
+      </p:transition>
+    </mc:Choice>
+    <mc:Fallback>
+      <p:transition spd="slow">
+        <p:fade/>
+      </p:transition>
+    </mc:Fallback>
+  </mc:AlternateContent>
   <p:hf hdr="0"/>
   <p:txStyles>
     <p:titleStyle>
@@ -13641,6 +13809,18 @@
   <p:clrMapOvr>
     <a:masterClrMapping/>
   </p:clrMapOvr>
+  <mc:AlternateContent xmlns:mc="http://schemas.openxmlformats.org/markup-compatibility/2006">
+    <mc:Choice xmlns:p159="http://schemas.microsoft.com/office/powerpoint/2015/09/main" Requires="p159">
+      <p:transition xmlns:p14="http://schemas.microsoft.com/office/powerpoint/2010/main" spd="slow" p14:dur="2000">
+        <p159:morph option="byObject"/>
+      </p:transition>
+    </mc:Choice>
+    <mc:Fallback>
+      <p:transition spd="slow">
+        <p:fade/>
+      </p:transition>
+    </mc:Fallback>
+  </mc:AlternateContent>
 </p:sld>
 </file>
 
@@ -13869,6 +14049,18 @@
   <p:clrMapOvr>
     <a:masterClrMapping/>
   </p:clrMapOvr>
+  <mc:AlternateContent xmlns:mc="http://schemas.openxmlformats.org/markup-compatibility/2006">
+    <mc:Choice xmlns:p159="http://schemas.microsoft.com/office/powerpoint/2015/09/main" Requires="p159">
+      <p:transition xmlns:p14="http://schemas.microsoft.com/office/powerpoint/2010/main" spd="slow" p14:dur="2000">
+        <p159:morph option="byObject"/>
+      </p:transition>
+    </mc:Choice>
+    <mc:Fallback>
+      <p:transition spd="slow">
+        <p:fade/>
+      </p:transition>
+    </mc:Fallback>
+  </mc:AlternateContent>
 </p:sld>
 </file>
 
@@ -13912,7 +14104,19 @@
           <a:p>
             <a:r>
               <a:rPr lang="cs-CZ" dirty="0"/>
-              <a:t>Nastavení</a:t>
+              <a:t>Nastavení </a:t>
+            </a:r>
+            <a:r>
+              <a:rPr lang="cs-CZ" b="0" dirty="0"/>
+              <a:t>(</a:t>
+            </a:r>
+            <a:r>
+              <a:rPr lang="cs-CZ" b="0" dirty="0" err="1"/>
+              <a:t>settings.tsx</a:t>
+            </a:r>
+            <a:r>
+              <a:rPr lang="cs-CZ" b="0" dirty="0"/>
+              <a:t>)</a:t>
             </a:r>
           </a:p>
         </p:txBody>
@@ -14077,6 +14281,18 @@
   <p:clrMapOvr>
     <a:masterClrMapping/>
   </p:clrMapOvr>
+  <mc:AlternateContent xmlns:mc="http://schemas.openxmlformats.org/markup-compatibility/2006">
+    <mc:Choice xmlns:p159="http://schemas.microsoft.com/office/powerpoint/2015/09/main" Requires="p159">
+      <p:transition xmlns:p14="http://schemas.microsoft.com/office/powerpoint/2010/main" spd="slow" p14:dur="2000">
+        <p159:morph option="byObject"/>
+      </p:transition>
+    </mc:Choice>
+    <mc:Fallback>
+      <p:transition spd="slow">
+        <p:fade/>
+      </p:transition>
+    </mc:Fallback>
+  </mc:AlternateContent>
 </p:sld>
 </file>
 
@@ -14120,8 +14336,21 @@
           <a:p>
             <a:r>
               <a:rPr lang="cs-CZ" dirty="0"/>
-              <a:t>Herní menu</a:t>
-            </a:r>
+              <a:t>Herní menu </a:t>
+            </a:r>
+            <a:r>
+              <a:rPr lang="cs-CZ" b="0" dirty="0"/>
+              <a:t>(</a:t>
+            </a:r>
+            <a:r>
+              <a:rPr lang="cs-CZ" b="0" dirty="0" err="1"/>
+              <a:t>menu.tsx</a:t>
+            </a:r>
+            <a:r>
+              <a:rPr lang="cs-CZ" b="0" dirty="0"/>
+              <a:t>)</a:t>
+            </a:r>
+            <a:endParaRPr lang="cs-CZ" dirty="0"/>
           </a:p>
         </p:txBody>
       </p:sp>
@@ -14244,6 +14473,18 @@
   <p:clrMapOvr>
     <a:masterClrMapping/>
   </p:clrMapOvr>
+  <mc:AlternateContent xmlns:mc="http://schemas.openxmlformats.org/markup-compatibility/2006">
+    <mc:Choice xmlns:p159="http://schemas.microsoft.com/office/powerpoint/2015/09/main" Requires="p159">
+      <p:transition xmlns:p14="http://schemas.microsoft.com/office/powerpoint/2010/main" spd="slow" p14:dur="2000">
+        <p159:morph option="byObject"/>
+      </p:transition>
+    </mc:Choice>
+    <mc:Fallback>
+      <p:transition spd="slow">
+        <p:fade/>
+      </p:transition>
+    </mc:Fallback>
+  </mc:AlternateContent>
 </p:sld>
 </file>
 
@@ -14287,8 +14528,21 @@
           <a:p>
             <a:r>
               <a:rPr lang="cs-CZ" dirty="0"/>
-              <a:t>Postup</a:t>
-            </a:r>
+              <a:t>Postup </a:t>
+            </a:r>
+            <a:r>
+              <a:rPr lang="cs-CZ" b="0" dirty="0"/>
+              <a:t>(</a:t>
+            </a:r>
+            <a:r>
+              <a:rPr lang="cs-CZ" b="0" dirty="0" err="1"/>
+              <a:t>progress.tsx</a:t>
+            </a:r>
+            <a:r>
+              <a:rPr lang="cs-CZ" b="0" dirty="0"/>
+              <a:t>)</a:t>
+            </a:r>
+            <a:endParaRPr lang="cs-CZ" dirty="0"/>
           </a:p>
         </p:txBody>
       </p:sp>
@@ -14421,6 +14675,18 @@
   <p:clrMapOvr>
     <a:masterClrMapping/>
   </p:clrMapOvr>
+  <mc:AlternateContent xmlns:mc="http://schemas.openxmlformats.org/markup-compatibility/2006">
+    <mc:Choice xmlns:p159="http://schemas.microsoft.com/office/powerpoint/2015/09/main" Requires="p159">
+      <p:transition xmlns:p14="http://schemas.microsoft.com/office/powerpoint/2010/main" spd="slow" p14:dur="2000">
+        <p159:morph option="byObject"/>
+      </p:transition>
+    </mc:Choice>
+    <mc:Fallback>
+      <p:transition spd="slow">
+        <p:fade/>
+      </p:transition>
+    </mc:Fallback>
+  </mc:AlternateContent>
 </p:sld>
 </file>
 
@@ -14464,8 +14730,21 @@
           <a:p>
             <a:r>
               <a:rPr lang="cs-CZ" dirty="0"/>
-              <a:t>Výběr úrovní</a:t>
-            </a:r>
+              <a:t>Výběr úrovní </a:t>
+            </a:r>
+            <a:r>
+              <a:rPr lang="cs-CZ" b="0" dirty="0"/>
+              <a:t>(</a:t>
+            </a:r>
+            <a:r>
+              <a:rPr lang="cs-CZ" b="0" dirty="0" err="1"/>
+              <a:t>levels.tsx</a:t>
+            </a:r>
+            <a:r>
+              <a:rPr lang="cs-CZ" b="0" dirty="0"/>
+              <a:t>)</a:t>
+            </a:r>
+            <a:endParaRPr lang="cs-CZ" dirty="0"/>
           </a:p>
         </p:txBody>
       </p:sp>
@@ -14606,6 +14885,18 @@
   <p:clrMapOvr>
     <a:masterClrMapping/>
   </p:clrMapOvr>
+  <mc:AlternateContent xmlns:mc="http://schemas.openxmlformats.org/markup-compatibility/2006">
+    <mc:Choice xmlns:p159="http://schemas.microsoft.com/office/powerpoint/2015/09/main" Requires="p159">
+      <p:transition xmlns:p14="http://schemas.microsoft.com/office/powerpoint/2010/main" spd="slow" p14:dur="2000">
+        <p159:morph option="byObject"/>
+      </p:transition>
+    </mc:Choice>
+    <mc:Fallback>
+      <p:transition spd="slow">
+        <p:fade/>
+      </p:transition>
+    </mc:Fallback>
+  </mc:AlternateContent>
 </p:sld>
 </file>
 
@@ -14651,6 +14942,19 @@
               <a:rPr lang="cs-CZ" dirty="0"/>
               <a:t>Hra </a:t>
             </a:r>
+            <a:r>
+              <a:rPr lang="cs-CZ" b="0" dirty="0"/>
+              <a:t>(</a:t>
+            </a:r>
+            <a:r>
+              <a:rPr lang="cs-CZ" b="0" dirty="0" err="1"/>
+              <a:t>game.tsx</a:t>
+            </a:r>
+            <a:r>
+              <a:rPr lang="cs-CZ" b="0" dirty="0"/>
+              <a:t>)</a:t>
+            </a:r>
+            <a:endParaRPr lang="cs-CZ" dirty="0"/>
           </a:p>
         </p:txBody>
       </p:sp>
@@ -14770,6 +15074,18 @@
   <p:clrMapOvr>
     <a:masterClrMapping/>
   </p:clrMapOvr>
+  <mc:AlternateContent xmlns:mc="http://schemas.openxmlformats.org/markup-compatibility/2006">
+    <mc:Choice xmlns:p159="http://schemas.microsoft.com/office/powerpoint/2015/09/main" Requires="p159">
+      <p:transition xmlns:p14="http://schemas.microsoft.com/office/powerpoint/2010/main" spd="slow" p14:dur="2000">
+        <p159:morph option="byObject"/>
+      </p:transition>
+    </mc:Choice>
+    <mc:Fallback>
+      <p:transition spd="slow">
+        <p:fade/>
+      </p:transition>
+    </mc:Fallback>
+  </mc:AlternateContent>
 </p:sld>
 </file>
 
@@ -14813,7 +15129,35 @@
           <a:p>
             <a:r>
               <a:rPr lang="cs-CZ" dirty="0"/>
-              <a:t>Výhra </a:t>
+              <a:t>Výhra</a:t>
+            </a:r>
+            <a:r>
+              <a:rPr lang="en-GB" dirty="0"/>
+              <a:t> </a:t>
+            </a:r>
+            <a:r>
+              <a:rPr lang="cs-CZ" b="0" dirty="0"/>
+              <a:t>(</a:t>
+            </a:r>
+            <a:r>
+              <a:rPr lang="en-GB" b="0" dirty="0"/>
+              <a:t>win</a:t>
+            </a:r>
+            <a:r>
+              <a:rPr lang="cs-CZ" b="0" dirty="0"/>
+              <a:t>.</a:t>
+            </a:r>
+            <a:r>
+              <a:rPr lang="cs-CZ" b="0" dirty="0" err="1"/>
+              <a:t>tsx</a:t>
+            </a:r>
+            <a:r>
+              <a:rPr lang="cs-CZ" b="0" dirty="0"/>
+              <a:t>)</a:t>
+            </a:r>
+            <a:r>
+              <a:rPr lang="cs-CZ" dirty="0"/>
+              <a:t> </a:t>
             </a:r>
           </a:p>
         </p:txBody>
@@ -14930,6 +15274,18 @@
   <p:clrMapOvr>
     <a:masterClrMapping/>
   </p:clrMapOvr>
+  <mc:AlternateContent xmlns:mc="http://schemas.openxmlformats.org/markup-compatibility/2006">
+    <mc:Choice xmlns:p159="http://schemas.microsoft.com/office/powerpoint/2015/09/main" Requires="p159">
+      <p:transition xmlns:p14="http://schemas.microsoft.com/office/powerpoint/2010/main" spd="slow" p14:dur="2000">
+        <p159:morph option="byObject"/>
+      </p:transition>
+    </mc:Choice>
+    <mc:Fallback>
+      <p:transition spd="slow">
+        <p:fade/>
+      </p:transition>
+    </mc:Fallback>
+  </mc:AlternateContent>
 </p:sld>
 </file>
 
@@ -14972,10 +15328,9 @@
           <a:lstStyle/>
           <a:p>
             <a:r>
-              <a:rPr lang="cs-CZ"/>
-              <a:t>Shrnutí</a:t>
-            </a:r>
-            <a:endParaRPr lang="cs-CZ" dirty="0"/>
+              <a:rPr lang="cs-CZ" dirty="0"/>
+              <a:t>Možnosti rozšíření</a:t>
+            </a:r>
           </a:p>
         </p:txBody>
       </p:sp>
@@ -15006,7 +15361,7 @@
             </a:pPr>
             <a:r>
               <a:rPr lang="cs-CZ" dirty="0"/>
-              <a:t>Aplikace podporuje pouze češtinu</a:t>
+              <a:t>Hudba na pozadí</a:t>
             </a:r>
           </a:p>
           <a:p>
@@ -15016,7 +15371,7 @@
             </a:pPr>
             <a:r>
               <a:rPr lang="cs-CZ" dirty="0"/>
-              <a:t>Přidán volitelný časový limit</a:t>
+              <a:t>Haptika u tlačítek</a:t>
             </a:r>
           </a:p>
           <a:p>
@@ -15026,39 +15381,7 @@
             </a:pPr>
             <a:r>
               <a:rPr lang="cs-CZ" dirty="0"/>
-              <a:t>Výherní obrazovka obsahuje animace a obrázky</a:t>
-            </a:r>
-          </a:p>
-          <a:p>
-            <a:pPr marL="457200" indent="-457200">
-              <a:buFont typeface="Arial" panose="020B0604020202020204" pitchFamily="34" charset="0"/>
-              <a:buChar char="•"/>
-            </a:pPr>
-            <a:r>
-              <a:rPr lang="cs-CZ" dirty="0"/>
-              <a:t>Přehled postupu formou herního stromu a grafu</a:t>
-            </a:r>
-          </a:p>
-          <a:p>
-            <a:pPr marL="457200" indent="-457200">
-              <a:buFont typeface="Arial" panose="020B0604020202020204" pitchFamily="34" charset="0"/>
-              <a:buChar char="•"/>
-            </a:pPr>
-            <a:r>
-              <a:rPr lang="cs-CZ" dirty="0"/>
-              <a:t>Data uložena v </a:t>
-            </a:r>
-            <a:r>
-              <a:rPr lang="cs-CZ" b="1" dirty="0" err="1"/>
-              <a:t>AsyncStorage</a:t>
-            </a:r>
-            <a:r>
-              <a:rPr lang="cs-CZ" dirty="0"/>
-              <a:t>, slova ve strukturovaném </a:t>
-            </a:r>
-            <a:r>
-              <a:rPr lang="cs-CZ" b="1" dirty="0"/>
-              <a:t>JSON</a:t>
+              <a:t>Lokalizace</a:t>
             </a:r>
           </a:p>
         </p:txBody>
@@ -15103,6 +15426,18 @@
   <p:clrMapOvr>
     <a:masterClrMapping/>
   </p:clrMapOvr>
+  <mc:AlternateContent xmlns:mc="http://schemas.openxmlformats.org/markup-compatibility/2006">
+    <mc:Choice xmlns:p159="http://schemas.microsoft.com/office/powerpoint/2015/09/main" Requires="p159">
+      <p:transition xmlns:p14="http://schemas.microsoft.com/office/powerpoint/2010/main" spd="slow" p14:dur="2000">
+        <p159:morph option="byObject"/>
+      </p:transition>
+    </mc:Choice>
+    <mc:Fallback>
+      <p:transition spd="slow">
+        <p:fade/>
+      </p:transition>
+    </mc:Fallback>
+  </mc:AlternateContent>
 </p:sld>
 </file>
 
@@ -15898,22 +16233,12 @@
 </file>
 
 <file path=customXml/item1.xml><?xml version="1.0" encoding="utf-8"?>
-<p:properties xmlns:p="http://schemas.microsoft.com/office/2006/metadata/properties" xmlns:xsi="http://www.w3.org/2001/XMLSchema-instance" xmlns:pc="http://schemas.microsoft.com/office/infopath/2007/PartnerControls">
-  <documentManagement>
-    <_ip_UnifiedCompliancePolicyUIAction xmlns="http://schemas.microsoft.com/sharepoint/v3" xsi:nil="true"/>
-    <Image xmlns="71af3243-3dd4-4a8d-8c0d-dd76da1f02a5">
-      <Url xsi:nil="true"/>
-      <Description xsi:nil="true"/>
-    </Image>
-    <Status xmlns="71af3243-3dd4-4a8d-8c0d-dd76da1f02a5">Not started</Status>
-    <_ip_UnifiedCompliancePolicyProperties xmlns="http://schemas.microsoft.com/sharepoint/v3" xsi:nil="true"/>
-    <ImageTagsTaxHTField xmlns="71af3243-3dd4-4a8d-8c0d-dd76da1f02a5">
-      <Terms xmlns="http://schemas.microsoft.com/office/infopath/2007/PartnerControls"/>
-    </ImageTagsTaxHTField>
-    <TaxCatchAll xmlns="230e9df3-be65-4c73-a93b-d1236ebd677e"/>
-    <MediaServiceKeyPoints xmlns="71af3243-3dd4-4a8d-8c0d-dd76da1f02a5" xsi:nil="true"/>
-  </documentManagement>
-</p:properties>
+<?mso-contentType ?>
+<FormTemplates xmlns="http://schemas.microsoft.com/sharepoint/v3/contenttype/forms">
+  <Display>DocumentLibraryForm</Display>
+  <Edit>DocumentLibraryForm</Edit>
+  <New>DocumentLibraryForm</New>
+</FormTemplates>
 </file>
 
 <file path=customXml/item2.xml><?xml version="1.0" encoding="utf-8"?>
@@ -16199,22 +16524,28 @@
 </file>
 
 <file path=customXml/item3.xml><?xml version="1.0" encoding="utf-8"?>
-<?mso-contentType ?>
-<FormTemplates xmlns="http://schemas.microsoft.com/sharepoint/v3/contenttype/forms">
-  <Display>DocumentLibraryForm</Display>
-  <Edit>DocumentLibraryForm</Edit>
-  <New>DocumentLibraryForm</New>
-</FormTemplates>
+<p:properties xmlns:p="http://schemas.microsoft.com/office/2006/metadata/properties" xmlns:xsi="http://www.w3.org/2001/XMLSchema-instance" xmlns:pc="http://schemas.microsoft.com/office/infopath/2007/PartnerControls">
+  <documentManagement>
+    <_ip_UnifiedCompliancePolicyUIAction xmlns="http://schemas.microsoft.com/sharepoint/v3" xsi:nil="true"/>
+    <Image xmlns="71af3243-3dd4-4a8d-8c0d-dd76da1f02a5">
+      <Url xsi:nil="true"/>
+      <Description xsi:nil="true"/>
+    </Image>
+    <Status xmlns="71af3243-3dd4-4a8d-8c0d-dd76da1f02a5">Not started</Status>
+    <_ip_UnifiedCompliancePolicyProperties xmlns="http://schemas.microsoft.com/sharepoint/v3" xsi:nil="true"/>
+    <ImageTagsTaxHTField xmlns="71af3243-3dd4-4a8d-8c0d-dd76da1f02a5">
+      <Terms xmlns="http://schemas.microsoft.com/office/infopath/2007/PartnerControls"/>
+    </ImageTagsTaxHTField>
+    <TaxCatchAll xmlns="230e9df3-be65-4c73-a93b-d1236ebd677e"/>
+    <MediaServiceKeyPoints xmlns="71af3243-3dd4-4a8d-8c0d-dd76da1f02a5" xsi:nil="true"/>
+  </documentManagement>
+</p:properties>
 </file>
 
 <file path=customXml/itemProps1.xml><?xml version="1.0" encoding="utf-8"?>
-<ds:datastoreItem xmlns:ds="http://schemas.openxmlformats.org/officeDocument/2006/customXml" ds:itemID="{4D5BAB77-79E1-4739-AA51-10C9079186D6}">
+<ds:datastoreItem xmlns:ds="http://schemas.openxmlformats.org/officeDocument/2006/customXml" ds:itemID="{85334180-0405-413B-834A-44FA9E05ADB7}">
   <ds:schemaRefs>
-    <ds:schemaRef ds:uri="http://schemas.microsoft.com/office/2006/metadata/properties"/>
-    <ds:schemaRef ds:uri="http://schemas.microsoft.com/office/infopath/2007/PartnerControls"/>
-    <ds:schemaRef ds:uri="http://schemas.microsoft.com/sharepoint/v3"/>
-    <ds:schemaRef ds:uri="71af3243-3dd4-4a8d-8c0d-dd76da1f02a5"/>
-    <ds:schemaRef ds:uri="230e9df3-be65-4c73-a93b-d1236ebd677e"/>
+    <ds:schemaRef ds:uri="http://schemas.microsoft.com/sharepoint/v3/contenttype/forms"/>
   </ds:schemaRefs>
 </ds:datastoreItem>
 </file>
@@ -16241,9 +16572,13 @@
 </file>
 
 <file path=customXml/itemProps3.xml><?xml version="1.0" encoding="utf-8"?>
-<ds:datastoreItem xmlns:ds="http://schemas.openxmlformats.org/officeDocument/2006/customXml" ds:itemID="{85334180-0405-413B-834A-44FA9E05ADB7}">
+<ds:datastoreItem xmlns:ds="http://schemas.openxmlformats.org/officeDocument/2006/customXml" ds:itemID="{4D5BAB77-79E1-4739-AA51-10C9079186D6}">
   <ds:schemaRefs>
-    <ds:schemaRef ds:uri="http://schemas.microsoft.com/sharepoint/v3/contenttype/forms"/>
+    <ds:schemaRef ds:uri="http://schemas.microsoft.com/office/2006/metadata/properties"/>
+    <ds:schemaRef ds:uri="http://schemas.microsoft.com/office/infopath/2007/PartnerControls"/>
+    <ds:schemaRef ds:uri="http://schemas.microsoft.com/sharepoint/v3"/>
+    <ds:schemaRef ds:uri="71af3243-3dd4-4a8d-8c0d-dd76da1f02a5"/>
+    <ds:schemaRef ds:uri="230e9df3-be65-4c73-a93b-d1236ebd677e"/>
   </ds:schemaRefs>
 </ds:datastoreItem>
 </file>

</xml_diff>